<commit_message>
Modified the poster for the final presentation.
</commit_message>
<xml_diff>
--- a/Team27_poster_final.pptx
+++ b/Team27_poster_final.pptx
@@ -4508,7 +4508,7 @@
   <dgm:whole/>
   <dgm:extLst>
     <a:ext uri="http://schemas.microsoft.com/office/drawing/2008/diagram">
-      <dsp:dataModelExt xmlns:dsp="http://schemas.microsoft.com/office/drawing/2008/diagram" relId="rId24" minVer="http://schemas.openxmlformats.org/drawingml/2006/diagram"/>
+      <dsp:dataModelExt xmlns:dsp="http://schemas.microsoft.com/office/drawing/2008/diagram" relId="rId23" minVer="http://schemas.openxmlformats.org/drawingml/2006/diagram"/>
     </a:ext>
   </dgm:extLst>
 </dgm:dataModel>
@@ -4644,7 +4644,7 @@
   <dgm:whole/>
   <dgm:extLst>
     <a:ext uri="http://schemas.microsoft.com/office/drawing/2008/diagram">
-      <dsp:dataModelExt xmlns:dsp="http://schemas.microsoft.com/office/drawing/2008/diagram" relId="rId29" minVer="http://schemas.openxmlformats.org/drawingml/2006/diagram"/>
+      <dsp:dataModelExt xmlns:dsp="http://schemas.microsoft.com/office/drawing/2008/diagram" relId="rId28" minVer="http://schemas.openxmlformats.org/drawingml/2006/diagram"/>
     </a:ext>
   </dgm:extLst>
 </dgm:dataModel>
@@ -10570,7 +10570,7 @@
           <a:p>
             <a:fld id="{A8E712BA-B0F1-4B2F-9F0A-5ED5FB82B5CE}" type="datetimeFigureOut">
               <a:rPr lang="en-IN" smtClean="0"/>
-              <a:t>08-06-2020</a:t>
+              <a:t>08/06/20</a:t>
             </a:fld>
             <a:endParaRPr lang="en-IN"/>
           </a:p>
@@ -10740,7 +10740,7 @@
           <a:p>
             <a:fld id="{A8E712BA-B0F1-4B2F-9F0A-5ED5FB82B5CE}" type="datetimeFigureOut">
               <a:rPr lang="en-IN" smtClean="0"/>
-              <a:t>08-06-2020</a:t>
+              <a:t>08/06/20</a:t>
             </a:fld>
             <a:endParaRPr lang="en-IN"/>
           </a:p>
@@ -10920,7 +10920,7 @@
           <a:p>
             <a:fld id="{A8E712BA-B0F1-4B2F-9F0A-5ED5FB82B5CE}" type="datetimeFigureOut">
               <a:rPr lang="en-IN" smtClean="0"/>
-              <a:t>08-06-2020</a:t>
+              <a:t>08/06/20</a:t>
             </a:fld>
             <a:endParaRPr lang="en-IN"/>
           </a:p>
@@ -11090,7 +11090,7 @@
           <a:p>
             <a:fld id="{A8E712BA-B0F1-4B2F-9F0A-5ED5FB82B5CE}" type="datetimeFigureOut">
               <a:rPr lang="en-IN" smtClean="0"/>
-              <a:t>08-06-2020</a:t>
+              <a:t>08/06/20</a:t>
             </a:fld>
             <a:endParaRPr lang="en-IN"/>
           </a:p>
@@ -11334,7 +11334,7 @@
           <a:p>
             <a:fld id="{A8E712BA-B0F1-4B2F-9F0A-5ED5FB82B5CE}" type="datetimeFigureOut">
               <a:rPr lang="en-IN" smtClean="0"/>
-              <a:t>08-06-2020</a:t>
+              <a:t>08/06/20</a:t>
             </a:fld>
             <a:endParaRPr lang="en-IN"/>
           </a:p>
@@ -11566,7 +11566,7 @@
           <a:p>
             <a:fld id="{A8E712BA-B0F1-4B2F-9F0A-5ED5FB82B5CE}" type="datetimeFigureOut">
               <a:rPr lang="en-IN" smtClean="0"/>
-              <a:t>08-06-2020</a:t>
+              <a:t>08/06/20</a:t>
             </a:fld>
             <a:endParaRPr lang="en-IN"/>
           </a:p>
@@ -11933,7 +11933,7 @@
           <a:p>
             <a:fld id="{A8E712BA-B0F1-4B2F-9F0A-5ED5FB82B5CE}" type="datetimeFigureOut">
               <a:rPr lang="en-IN" smtClean="0"/>
-              <a:t>08-06-2020</a:t>
+              <a:t>08/06/20</a:t>
             </a:fld>
             <a:endParaRPr lang="en-IN"/>
           </a:p>
@@ -12051,7 +12051,7 @@
           <a:p>
             <a:fld id="{A8E712BA-B0F1-4B2F-9F0A-5ED5FB82B5CE}" type="datetimeFigureOut">
               <a:rPr lang="en-IN" smtClean="0"/>
-              <a:t>08-06-2020</a:t>
+              <a:t>08/06/20</a:t>
             </a:fld>
             <a:endParaRPr lang="en-IN"/>
           </a:p>
@@ -12146,7 +12146,7 @@
           <a:p>
             <a:fld id="{A8E712BA-B0F1-4B2F-9F0A-5ED5FB82B5CE}" type="datetimeFigureOut">
               <a:rPr lang="en-IN" smtClean="0"/>
-              <a:t>08-06-2020</a:t>
+              <a:t>08/06/20</a:t>
             </a:fld>
             <a:endParaRPr lang="en-IN"/>
           </a:p>
@@ -12423,7 +12423,7 @@
           <a:p>
             <a:fld id="{A8E712BA-B0F1-4B2F-9F0A-5ED5FB82B5CE}" type="datetimeFigureOut">
               <a:rPr lang="en-IN" smtClean="0"/>
-              <a:t>08-06-2020</a:t>
+              <a:t>08/06/20</a:t>
             </a:fld>
             <a:endParaRPr lang="en-IN"/>
           </a:p>
@@ -12680,7 +12680,7 @@
           <a:p>
             <a:fld id="{A8E712BA-B0F1-4B2F-9F0A-5ED5FB82B5CE}" type="datetimeFigureOut">
               <a:rPr lang="en-IN" smtClean="0"/>
-              <a:t>08-06-2020</a:t>
+              <a:t>08/06/20</a:t>
             </a:fld>
             <a:endParaRPr lang="en-IN"/>
           </a:p>
@@ -12893,7 +12893,7 @@
           <a:p>
             <a:fld id="{A8E712BA-B0F1-4B2F-9F0A-5ED5FB82B5CE}" type="datetimeFigureOut">
               <a:rPr lang="en-IN" smtClean="0"/>
-              <a:t>08-06-2020</a:t>
+              <a:t>08/06/20</a:t>
             </a:fld>
             <a:endParaRPr lang="en-IN"/>
           </a:p>
@@ -15036,7 +15036,7 @@
         </p:nvSpPr>
         <p:spPr>
           <a:xfrm>
-            <a:off x="363871" y="18038133"/>
+            <a:off x="363871" y="18101928"/>
             <a:ext cx="7625284" cy="2369880"/>
           </a:xfrm>
           <a:prstGeom prst="rect">
@@ -15122,7 +15122,7 @@
                   <a:prstClr val="black"/>
                 </a:solidFill>
               </a:rPr>
-              <a:t>4. Upload the customised H5P function into Drupal, and further </a:t>
+              <a:t>4. Integrate customised H5P content type - Parsons Puzzle into </a:t>
             </a:r>
             <a:r>
               <a:rPr lang="en-AU" sz="2000" dirty="0" err="1">
@@ -15275,36 +15275,6 @@
       </p:pic>
       <p:pic>
         <p:nvPicPr>
-          <p:cNvPr id="46" name="Picture 45">
-            <a:extLst>
-              <a:ext uri="{FF2B5EF4-FFF2-40B4-BE49-F238E27FC236}">
-                <a16:creationId xmlns:a16="http://schemas.microsoft.com/office/drawing/2014/main" id="{7C591ADD-0A5E-44E1-A625-C37B77F9313E}"/>
-              </a:ext>
-            </a:extLst>
-          </p:cNvPr>
-          <p:cNvPicPr>
-            <a:picLocks noChangeAspect="1"/>
-          </p:cNvPicPr>
-          <p:nvPr/>
-        </p:nvPicPr>
-        <p:blipFill>
-          <a:blip r:embed="rId14"/>
-          <a:stretch>
-            <a:fillRect/>
-          </a:stretch>
-        </p:blipFill>
-        <p:spPr>
-          <a:xfrm>
-            <a:off x="468411" y="14981873"/>
-            <a:ext cx="1020856" cy="983268"/>
-          </a:xfrm>
-          <a:prstGeom prst="rect">
-            <a:avLst/>
-          </a:prstGeom>
-        </p:spPr>
-      </p:pic>
-      <p:pic>
-        <p:nvPicPr>
           <p:cNvPr id="48" name="Picture 47">
             <a:extLst>
               <a:ext uri="{FF2B5EF4-FFF2-40B4-BE49-F238E27FC236}">
@@ -15318,7 +15288,7 @@
           <p:nvPr/>
         </p:nvPicPr>
         <p:blipFill rotWithShape="1">
-          <a:blip r:embed="rId15">
+          <a:blip r:embed="rId14">
             <a:extLst>
               <a:ext uri="{28A0092B-C50C-407E-A947-70E740481C1C}">
                 <a14:useLocalDpi xmlns:a14="http://schemas.microsoft.com/office/drawing/2010/main" val="0"/>
@@ -15993,13 +15963,13 @@
           <p:nvPr/>
         </p:nvPicPr>
         <p:blipFill>
-          <a:blip r:embed="rId16">
+          <a:blip r:embed="rId15">
             <a:extLst>
               <a:ext uri="{28A0092B-C50C-407E-A947-70E740481C1C}">
                 <a14:useLocalDpi xmlns:a14="http://schemas.microsoft.com/office/drawing/2010/main" val="0"/>
               </a:ext>
               <a:ext uri="{96DAC541-7B7A-43D3-8B79-37D633B846F1}">
-                <asvg:svgBlip xmlns:asvg="http://schemas.microsoft.com/office/drawing/2016/SVG/main" r:embed="rId17"/>
+                <asvg:svgBlip xmlns:asvg="http://schemas.microsoft.com/office/drawing/2016/SVG/main" r:embed="rId16"/>
               </a:ext>
             </a:extLst>
           </a:blip>
@@ -16032,13 +16002,13 @@
           <p:nvPr/>
         </p:nvPicPr>
         <p:blipFill>
-          <a:blip r:embed="rId18">
+          <a:blip r:embed="rId17">
             <a:extLst>
               <a:ext uri="{28A0092B-C50C-407E-A947-70E740481C1C}">
                 <a14:useLocalDpi xmlns:a14="http://schemas.microsoft.com/office/drawing/2010/main" val="0"/>
               </a:ext>
               <a:ext uri="{96DAC541-7B7A-43D3-8B79-37D633B846F1}">
-                <asvg:svgBlip xmlns:asvg="http://schemas.microsoft.com/office/drawing/2016/SVG/main" r:embed="rId19"/>
+                <asvg:svgBlip xmlns:asvg="http://schemas.microsoft.com/office/drawing/2016/SVG/main" r:embed="rId18"/>
               </a:ext>
             </a:extLst>
           </a:blip>
@@ -16080,7 +16050,7 @@
         </p:xfrm>
         <a:graphic>
           <a:graphicData uri="http://schemas.openxmlformats.org/drawingml/2006/diagram">
-            <dgm:relIds xmlns:dgm="http://schemas.openxmlformats.org/drawingml/2006/diagram" xmlns:r="http://schemas.openxmlformats.org/officeDocument/2006/relationships" r:dm="rId20" r:lo="rId21" r:qs="rId22" r:cs="rId23"/>
+            <dgm:relIds xmlns:dgm="http://schemas.openxmlformats.org/drawingml/2006/diagram" xmlns:r="http://schemas.openxmlformats.org/officeDocument/2006/relationships" r:dm="rId19" r:lo="rId20" r:qs="rId21" r:cs="rId22"/>
           </a:graphicData>
         </a:graphic>
       </p:graphicFrame>
@@ -17188,7 +17158,7 @@
         </p:xfrm>
         <a:graphic>
           <a:graphicData uri="http://schemas.openxmlformats.org/drawingml/2006/diagram">
-            <dgm:relIds xmlns:dgm="http://schemas.openxmlformats.org/drawingml/2006/diagram" xmlns:r="http://schemas.openxmlformats.org/officeDocument/2006/relationships" r:dm="rId25" r:lo="rId26" r:qs="rId27" r:cs="rId28"/>
+            <dgm:relIds xmlns:dgm="http://schemas.openxmlformats.org/drawingml/2006/diagram" xmlns:r="http://schemas.openxmlformats.org/officeDocument/2006/relationships" r:dm="rId24" r:lo="rId25" r:qs="rId26" r:cs="rId27"/>
           </a:graphicData>
         </a:graphic>
       </p:graphicFrame>
@@ -17249,10 +17219,10 @@
         </p:nvGrpSpPr>
         <p:grpSpPr>
           <a:xfrm>
-            <a:off x="8447011" y="9618130"/>
-            <a:ext cx="8123314" cy="5336455"/>
-            <a:chOff x="0" y="0"/>
-            <a:chExt cx="5565775" cy="3656385"/>
+            <a:off x="8443810" y="9635529"/>
+            <a:ext cx="7145761" cy="5256586"/>
+            <a:chOff x="0" y="50184"/>
+            <a:chExt cx="4902165" cy="3606201"/>
           </a:xfrm>
         </p:grpSpPr>
         <p:grpSp>
@@ -17437,13 +17407,13 @@
                   <p:nvPr/>
                 </p:nvPicPr>
                 <p:blipFill>
-                  <a:blip r:embed="rId30">
+                  <a:blip r:embed="rId29">
                     <a:extLst>
                       <a:ext uri="{28A0092B-C50C-407E-A947-70E740481C1C}">
                         <a14:useLocalDpi xmlns:a14="http://schemas.microsoft.com/office/drawing/2010/main" val="0"/>
                       </a:ext>
                       <a:ext uri="{96DAC541-7B7A-43D3-8B79-37D633B846F1}">
-                        <asvg:svgBlip xmlns:asvg="http://schemas.microsoft.com/office/drawing/2016/SVG/main" r:embed="rId31"/>
+                        <asvg:svgBlip xmlns:asvg="http://schemas.microsoft.com/office/drawing/2016/SVG/main" r:embed="rId30"/>
                       </a:ext>
                     </a:extLst>
                   </a:blip>
@@ -17624,13 +17594,13 @@
                   <p:nvPr/>
                 </p:nvPicPr>
                 <p:blipFill>
-                  <a:blip r:embed="rId32" cstate="print">
+                  <a:blip r:embed="rId31" cstate="print">
                     <a:extLst>
                       <a:ext uri="{28A0092B-C50C-407E-A947-70E740481C1C}">
                         <a14:useLocalDpi xmlns:a14="http://schemas.microsoft.com/office/drawing/2010/main" val="0"/>
                       </a:ext>
                       <a:ext uri="{96DAC541-7B7A-43D3-8B79-37D633B846F1}">
-                        <asvg:svgBlip xmlns:asvg="http://schemas.microsoft.com/office/drawing/2016/SVG/main" r:embed="rId33"/>
+                        <asvg:svgBlip xmlns:asvg="http://schemas.microsoft.com/office/drawing/2016/SVG/main" r:embed="rId32"/>
                       </a:ext>
                     </a:extLst>
                   </a:blip>
@@ -17663,13 +17633,13 @@
                   <p:nvPr/>
                 </p:nvPicPr>
                 <p:blipFill>
-                  <a:blip r:embed="rId34">
+                  <a:blip r:embed="rId33">
                     <a:extLst>
                       <a:ext uri="{28A0092B-C50C-407E-A947-70E740481C1C}">
                         <a14:useLocalDpi xmlns:a14="http://schemas.microsoft.com/office/drawing/2010/main" val="0"/>
                       </a:ext>
                       <a:ext uri="{96DAC541-7B7A-43D3-8B79-37D633B846F1}">
-                        <asvg:svgBlip xmlns:asvg="http://schemas.microsoft.com/office/drawing/2016/SVG/main" r:embed="rId35"/>
+                        <asvg:svgBlip xmlns:asvg="http://schemas.microsoft.com/office/drawing/2016/SVG/main" r:embed="rId34"/>
                       </a:ext>
                     </a:extLst>
                   </a:blip>
@@ -17954,7 +17924,7 @@
                   <p:nvPr/>
                 </p:nvPicPr>
                 <p:blipFill>
-                  <a:blip r:embed="rId36" cstate="print">
+                  <a:blip r:embed="rId35" cstate="print">
                     <a:extLst>
                       <a:ext uri="{28A0092B-C50C-407E-A947-70E740481C1C}">
                         <a14:useLocalDpi xmlns:a14="http://schemas.microsoft.com/office/drawing/2010/main" val="0"/>
@@ -18050,10 +18020,10 @@
           </p:nvGrpSpPr>
           <p:grpSpPr>
             <a:xfrm>
-              <a:off x="0" y="0"/>
-              <a:ext cx="5565775" cy="2582738"/>
-              <a:chOff x="0" y="0"/>
-              <a:chExt cx="5565775" cy="2582738"/>
+              <a:off x="0" y="50184"/>
+              <a:ext cx="4902165" cy="2532554"/>
+              <a:chOff x="0" y="50184"/>
+              <a:chExt cx="4902165" cy="2532554"/>
             </a:xfrm>
           </p:grpSpPr>
           <p:grpSp>
@@ -18071,9 +18041,9 @@
             <p:grpSpPr>
               <a:xfrm>
                 <a:off x="0" y="1614115"/>
-                <a:ext cx="3180080" cy="968623"/>
+                <a:ext cx="2921636" cy="968623"/>
                 <a:chOff x="0" y="0"/>
-                <a:chExt cx="3180080" cy="968623"/>
+                <a:chExt cx="2921636" cy="968623"/>
               </a:xfrm>
             </p:grpSpPr>
             <p:sp>
@@ -18091,7 +18061,7 @@
               <p:spPr>
                 <a:xfrm>
                   <a:off x="0" y="0"/>
-                  <a:ext cx="3180080" cy="968623"/>
+                  <a:ext cx="2921636" cy="968623"/>
                 </a:xfrm>
                 <a:prstGeom prst="roundRect">
                   <a:avLst/>
@@ -18218,7 +18188,7 @@
                   <p:nvPr/>
                 </p:nvPicPr>
                 <p:blipFill>
-                  <a:blip r:embed="rId37" cstate="print">
+                  <a:blip r:embed="rId36" cstate="print">
                     <a:extLst>
                       <a:ext uri="{28A0092B-C50C-407E-A947-70E740481C1C}">
                         <a14:useLocalDpi xmlns:a14="http://schemas.microsoft.com/office/drawing/2010/main" val="0"/>
@@ -18254,10 +18224,10 @@
               </p:nvGrpSpPr>
               <p:grpSpPr>
                 <a:xfrm>
-                  <a:off x="119270" y="143123"/>
-                  <a:ext cx="3003915" cy="388620"/>
-                  <a:chOff x="0" y="0"/>
-                  <a:chExt cx="3003915" cy="388620"/>
+                  <a:off x="119270" y="143202"/>
+                  <a:ext cx="2754393" cy="389494"/>
+                  <a:chOff x="0" y="79"/>
+                  <a:chExt cx="2754393" cy="389494"/>
                 </a:xfrm>
               </p:grpSpPr>
               <p:grpSp>
@@ -18274,10 +18244,10 @@
                 </p:nvGrpSpPr>
                 <p:grpSpPr>
                   <a:xfrm>
-                    <a:off x="0" y="0"/>
-                    <a:ext cx="3003915" cy="388620"/>
-                    <a:chOff x="-754049" y="23655"/>
-                    <a:chExt cx="3004143" cy="389334"/>
+                    <a:off x="0" y="79"/>
+                    <a:ext cx="2754393" cy="389494"/>
+                    <a:chOff x="-754049" y="23734"/>
+                    <a:chExt cx="2754602" cy="390210"/>
                   </a:xfrm>
                 </p:grpSpPr>
                 <p:grpSp>
@@ -18295,9 +18265,9 @@
                   <p:grpSpPr>
                     <a:xfrm>
                       <a:off x="-754049" y="23734"/>
-                      <a:ext cx="1326446" cy="389255"/>
+                      <a:ext cx="1210198" cy="389255"/>
                       <a:chOff x="-3005386" y="15786"/>
-                      <a:chExt cx="1326940" cy="389373"/>
+                      <a:chExt cx="1210649" cy="389373"/>
                     </a:xfrm>
                   </p:grpSpPr>
                   <p:sp>
@@ -18315,7 +18285,7 @@
                     <p:spPr>
                       <a:xfrm>
                         <a:off x="-3005386" y="15786"/>
-                        <a:ext cx="1287267" cy="389373"/>
+                        <a:ext cx="1149406" cy="389373"/>
                       </a:xfrm>
                       <a:prstGeom prst="roundRect">
                         <a:avLst/>
@@ -18379,13 +18349,13 @@
                       <p:nvPr/>
                     </p:nvPicPr>
                     <p:blipFill>
-                      <a:blip r:embed="rId38" cstate="print">
+                      <a:blip r:embed="rId37" cstate="print">
                         <a:extLst>
                           <a:ext uri="{28A0092B-C50C-407E-A947-70E740481C1C}">
                             <a14:useLocalDpi xmlns:a14="http://schemas.microsoft.com/office/drawing/2010/main" val="0"/>
                           </a:ext>
                           <a:ext uri="{96DAC541-7B7A-43D3-8B79-37D633B846F1}">
-                            <asvg:svgBlip xmlns:asvg="http://schemas.microsoft.com/office/drawing/2016/SVG/main" r:embed="rId39"/>
+                            <asvg:svgBlip xmlns:asvg="http://schemas.microsoft.com/office/drawing/2016/SVG/main" r:embed="rId38"/>
                           </a:ext>
                         </a:extLst>
                       </a:blip>
@@ -18417,8 +18387,8 @@
                     </p:nvSpPr>
                     <p:spPr>
                       <a:xfrm>
-                        <a:off x="-2706578" y="102979"/>
-                        <a:ext cx="1028132" cy="242229"/>
+                        <a:off x="-2645334" y="27138"/>
+                        <a:ext cx="850597" cy="216864"/>
                       </a:xfrm>
                       <a:prstGeom prst="rect">
                         <a:avLst/>
@@ -18475,10 +18445,10 @@
                   </p:nvGrpSpPr>
                   <p:grpSpPr>
                     <a:xfrm>
-                      <a:off x="937954" y="23655"/>
-                      <a:ext cx="1312140" cy="389255"/>
-                      <a:chOff x="938200" y="23661"/>
-                      <a:chExt cx="1312480" cy="389373"/>
+                      <a:off x="815537" y="24689"/>
+                      <a:ext cx="1185016" cy="389255"/>
+                      <a:chOff x="815751" y="24695"/>
+                      <a:chExt cx="1185323" cy="389373"/>
                     </a:xfrm>
                   </p:grpSpPr>
                   <p:sp>
@@ -18495,8 +18465,8 @@
                     </p:nvSpPr>
                     <p:spPr>
                       <a:xfrm>
-                        <a:off x="938200" y="23661"/>
-                        <a:ext cx="1218708" cy="389373"/>
+                        <a:off x="815751" y="24695"/>
+                        <a:ext cx="1133713" cy="389373"/>
                       </a:xfrm>
                       <a:prstGeom prst="roundRect">
                         <a:avLst/>
@@ -18559,8 +18529,8 @@
                     </p:nvSpPr>
                     <p:spPr>
                       <a:xfrm>
-                        <a:off x="1329585" y="102828"/>
-                        <a:ext cx="921095" cy="250345"/>
+                        <a:off x="1242397" y="37781"/>
+                        <a:ext cx="758677" cy="231767"/>
                       </a:xfrm>
                       <a:prstGeom prst="rect">
                         <a:avLst/>
@@ -18617,7 +18587,7 @@
                       <p:nvPr/>
                     </p:nvPicPr>
                     <p:blipFill>
-                      <a:blip r:embed="rId40" cstate="print">
+                      <a:blip r:embed="rId39" cstate="print">
                         <a:extLst>
                           <a:ext uri="{28A0092B-C50C-407E-A947-70E740481C1C}">
                             <a14:useLocalDpi xmlns:a14="http://schemas.microsoft.com/office/drawing/2010/main" val="0"/>
@@ -18630,7 +18600,7 @@
                     </p:blipFill>
                     <p:spPr>
                       <a:xfrm>
-                        <a:off x="994132" y="142080"/>
+                        <a:off x="902845" y="142918"/>
                         <a:ext cx="351475" cy="154879"/>
                       </a:xfrm>
                       <a:prstGeom prst="rect">
@@ -18654,7 +18624,7 @@
                 </p:nvSpPr>
                 <p:spPr>
                   <a:xfrm rot="16200000">
-                    <a:off x="1413537" y="59001"/>
+                    <a:off x="1296871" y="50100"/>
                     <a:ext cx="130860" cy="299003"/>
                   </a:xfrm>
                   <a:prstGeom prst="upDownArrow">
@@ -18720,10 +18690,10 @@
             </p:nvGrpSpPr>
             <p:grpSpPr>
               <a:xfrm>
-                <a:off x="0" y="0"/>
-                <a:ext cx="5565775" cy="1430656"/>
-                <a:chOff x="0" y="0"/>
-                <a:chExt cx="5565775" cy="1430656"/>
+                <a:off x="0" y="50184"/>
+                <a:ext cx="4902165" cy="1430656"/>
+                <a:chOff x="0" y="50184"/>
+                <a:chExt cx="4902165" cy="1430656"/>
               </a:xfrm>
             </p:grpSpPr>
             <p:grpSp>
@@ -18740,10 +18710,10 @@
               </p:nvGrpSpPr>
               <p:grpSpPr>
                 <a:xfrm>
-                  <a:off x="0" y="0"/>
-                  <a:ext cx="5565775" cy="1430656"/>
-                  <a:chOff x="0" y="0"/>
-                  <a:chExt cx="5565775" cy="1431235"/>
+                  <a:off x="0" y="50184"/>
+                  <a:ext cx="4902165" cy="1430656"/>
+                  <a:chOff x="0" y="50204"/>
+                  <a:chExt cx="4902165" cy="1431235"/>
                 </a:xfrm>
               </p:grpSpPr>
               <p:sp>
@@ -18761,7 +18731,7 @@
                 <p:spPr>
                   <a:xfrm>
                     <a:off x="135172" y="405517"/>
-                    <a:ext cx="2893695" cy="896840"/>
+                    <a:ext cx="2657578" cy="896840"/>
                   </a:xfrm>
                   <a:prstGeom prst="roundRect">
                     <a:avLst/>
@@ -18798,7 +18768,7 @@
                   </a:bodyPr>
                   <a:lstStyle/>
                   <a:p>
-                    <a:endParaRPr lang="en-US"/>
+                    <a:endParaRPr lang="en-US" dirty="0"/>
                   </a:p>
                 </p:txBody>
               </p:sp>
@@ -18816,8 +18786,8 @@
                 </p:nvSpPr>
                 <p:spPr>
                   <a:xfrm>
-                    <a:off x="0" y="0"/>
-                    <a:ext cx="5565775" cy="1431235"/>
+                    <a:off x="0" y="50204"/>
+                    <a:ext cx="4902165" cy="1431235"/>
                   </a:xfrm>
                   <a:prstGeom prst="roundRect">
                     <a:avLst/>
@@ -18854,7 +18824,7 @@
                   </a:bodyPr>
                   <a:lstStyle/>
                   <a:p>
-                    <a:endParaRPr lang="en-US"/>
+                    <a:endParaRPr lang="en-US" dirty="0"/>
                   </a:p>
                 </p:txBody>
               </p:sp>
@@ -18936,8 +18906,8 @@
                 </p:nvSpPr>
                 <p:spPr>
                   <a:xfrm>
-                    <a:off x="3816626" y="262393"/>
-                    <a:ext cx="1605915" cy="1041400"/>
+                    <a:off x="3379916" y="263192"/>
+                    <a:ext cx="1373748" cy="1041400"/>
                   </a:xfrm>
                   <a:prstGeom prst="roundRect">
                     <a:avLst/>
@@ -18974,7 +18944,7 @@
                   </a:bodyPr>
                   <a:lstStyle/>
                   <a:p>
-                    <a:endParaRPr lang="en-US"/>
+                    <a:endParaRPr lang="en-US" dirty="0"/>
                   </a:p>
                 </p:txBody>
               </p:sp>
@@ -18992,8 +18962,8 @@
                 </p:nvSpPr>
                 <p:spPr>
                   <a:xfrm>
-                    <a:off x="4007458" y="699715"/>
-                    <a:ext cx="1271905" cy="429260"/>
+                    <a:off x="3495555" y="780138"/>
+                    <a:ext cx="1155301" cy="429260"/>
                   </a:xfrm>
                   <a:prstGeom prst="roundRect">
                     <a:avLst/>
@@ -19050,7 +19020,7 @@
                 </p:nvSpPr>
                 <p:spPr>
                   <a:xfrm>
-                    <a:off x="1924216" y="500932"/>
+                    <a:off x="1703013" y="499895"/>
                     <a:ext cx="914400" cy="714375"/>
                   </a:xfrm>
                   <a:prstGeom prst="roundRect">
@@ -19165,7 +19135,7 @@
                 </p:nvSpPr>
                 <p:spPr>
                   <a:xfrm>
-                    <a:off x="1900362" y="874574"/>
+                    <a:off x="1676276" y="886179"/>
                     <a:ext cx="993775" cy="405130"/>
                   </a:xfrm>
                   <a:prstGeom prst="rect">
@@ -19223,13 +19193,13 @@
                   <p:nvPr/>
                 </p:nvPicPr>
                 <p:blipFill>
-                  <a:blip r:embed="rId41" cstate="print">
+                  <a:blip r:embed="rId40" cstate="print">
                     <a:extLst>
                       <a:ext uri="{28A0092B-C50C-407E-A947-70E740481C1C}">
                         <a14:useLocalDpi xmlns:a14="http://schemas.microsoft.com/office/drawing/2010/main" val="0"/>
                       </a:ext>
                       <a:ext uri="{96DAC541-7B7A-43D3-8B79-37D633B846F1}">
-                        <asvg:svgBlip xmlns:asvg="http://schemas.microsoft.com/office/drawing/2016/SVG/main" r:embed="rId42"/>
+                        <asvg:svgBlip xmlns:asvg="http://schemas.microsoft.com/office/drawing/2016/SVG/main" r:embed="rId41"/>
                       </a:ext>
                     </a:extLst>
                   </a:blip>
@@ -19261,10 +19231,10 @@
                 </p:nvGrpSpPr>
                 <p:grpSpPr>
                   <a:xfrm>
-                    <a:off x="2122999" y="53910"/>
-                    <a:ext cx="1451035" cy="309880"/>
-                    <a:chOff x="0" y="14153"/>
-                    <a:chExt cx="1451096" cy="309880"/>
+                    <a:off x="1971771" y="63346"/>
+                    <a:ext cx="1423090" cy="313102"/>
+                    <a:chOff x="-151234" y="23589"/>
+                    <a:chExt cx="1423150" cy="313102"/>
                   </a:xfrm>
                 </p:grpSpPr>
                 <p:pic>
@@ -19282,13 +19252,13 @@
                     <p:nvPr/>
                   </p:nvPicPr>
                   <p:blipFill>
-                    <a:blip r:embed="rId43" cstate="print">
+                    <a:blip r:embed="rId42" cstate="print">
                       <a:extLst>
                         <a:ext uri="{28A0092B-C50C-407E-A947-70E740481C1C}">
                           <a14:useLocalDpi xmlns:a14="http://schemas.microsoft.com/office/drawing/2010/main" val="0"/>
                         </a:ext>
                         <a:ext uri="{96DAC541-7B7A-43D3-8B79-37D633B846F1}">
-                          <asvg:svgBlip xmlns:asvg="http://schemas.microsoft.com/office/drawing/2016/SVG/main" r:embed="rId44"/>
+                          <asvg:svgBlip xmlns:asvg="http://schemas.microsoft.com/office/drawing/2016/SVG/main" r:embed="rId43"/>
                         </a:ext>
                       </a:extLst>
                     </a:blip>
@@ -19298,7 +19268,7 @@
                   </p:blipFill>
                   <p:spPr>
                     <a:xfrm>
-                      <a:off x="0" y="23854"/>
+                      <a:off x="-151234" y="23589"/>
                       <a:ext cx="262255" cy="262255"/>
                     </a:xfrm>
                     <a:prstGeom prst="rect">
@@ -19320,7 +19290,7 @@
                   </p:nvSpPr>
                   <p:spPr>
                     <a:xfrm>
-                      <a:off x="286868" y="14153"/>
+                      <a:off x="107688" y="26811"/>
                       <a:ext cx="1164228" cy="309880"/>
                     </a:xfrm>
                     <a:prstGeom prst="rect">
@@ -19372,8 +19342,8 @@
                 </p:nvSpPr>
                 <p:spPr>
                   <a:xfrm rot="16200000">
-                    <a:off x="1469211" y="706879"/>
-                    <a:ext cx="153975" cy="486300"/>
+                    <a:off x="1338531" y="799724"/>
+                    <a:ext cx="157028" cy="349895"/>
                   </a:xfrm>
                   <a:prstGeom prst="upDownArrow">
                     <a:avLst/>
@@ -19436,7 +19406,7 @@
                 </p:nvSpPr>
                 <p:spPr>
                   <a:xfrm>
-                    <a:off x="4110701" y="310101"/>
+                    <a:off x="3505989" y="402797"/>
                     <a:ext cx="1176655" cy="269875"/>
                   </a:xfrm>
                   <a:prstGeom prst="rect">
@@ -19462,7 +19432,7 @@
                       </a:spcAft>
                     </a:pPr>
                     <a:r>
-                      <a:rPr lang="en-AU" sz="1600" dirty="0" err="1">
+                      <a:rPr lang="en-AU" dirty="0" err="1">
                         <a:effectLst/>
                         <a:latin typeface="Calibri" panose="020F0502020204030204" pitchFamily="34" charset="0"/>
                         <a:ea typeface="Calibri" panose="020F0502020204030204" pitchFamily="34" charset="0"/>
@@ -19471,7 +19441,7 @@
                       <a:t>MyUni</a:t>
                     </a:r>
                     <a:r>
-                      <a:rPr lang="en-AU" sz="1600" dirty="0">
+                      <a:rPr lang="en-AU" dirty="0">
                         <a:effectLst/>
                         <a:latin typeface="Calibri" panose="020F0502020204030204" pitchFamily="34" charset="0"/>
                         <a:ea typeface="Calibri" panose="020F0502020204030204" pitchFamily="34" charset="0"/>
@@ -19497,13 +19467,13 @@
                   <p:nvPr/>
                 </p:nvPicPr>
                 <p:blipFill>
-                  <a:blip r:embed="rId45" cstate="print">
+                  <a:blip r:embed="rId44" cstate="print">
                     <a:extLst>
                       <a:ext uri="{28A0092B-C50C-407E-A947-70E740481C1C}">
                         <a14:useLocalDpi xmlns:a14="http://schemas.microsoft.com/office/drawing/2010/main" val="0"/>
                       </a:ext>
                       <a:ext uri="{96DAC541-7B7A-43D3-8B79-37D633B846F1}">
-                        <asvg:svgBlip xmlns:asvg="http://schemas.microsoft.com/office/drawing/2016/SVG/main" r:embed="rId46"/>
+                        <asvg:svgBlip xmlns:asvg="http://schemas.microsoft.com/office/drawing/2016/SVG/main" r:embed="rId45"/>
                       </a:ext>
                     </a:extLst>
                   </a:blip>
@@ -19513,7 +19483,7 @@
                 </p:blipFill>
                 <p:spPr>
                   <a:xfrm>
-                    <a:off x="2146852" y="572494"/>
+                    <a:off x="1948559" y="560849"/>
                     <a:ext cx="426085" cy="309880"/>
                   </a:xfrm>
                   <a:prstGeom prst="rect">
@@ -19536,13 +19506,13 @@
                   <p:nvPr/>
                 </p:nvPicPr>
                 <p:blipFill>
-                  <a:blip r:embed="rId45" cstate="print">
+                  <a:blip r:embed="rId44" cstate="print">
                     <a:extLst>
                       <a:ext uri="{28A0092B-C50C-407E-A947-70E740481C1C}">
                         <a14:useLocalDpi xmlns:a14="http://schemas.microsoft.com/office/drawing/2010/main" val="0"/>
                       </a:ext>
                       <a:ext uri="{96DAC541-7B7A-43D3-8B79-37D633B846F1}">
-                        <asvg:svgBlip xmlns:asvg="http://schemas.microsoft.com/office/drawing/2016/SVG/main" r:embed="rId46"/>
+                        <asvg:svgBlip xmlns:asvg="http://schemas.microsoft.com/office/drawing/2016/SVG/main" r:embed="rId45"/>
                       </a:ext>
                     </a:extLst>
                   </a:blip>
@@ -19552,7 +19522,7 @@
                 </p:blipFill>
                 <p:spPr>
                   <a:xfrm>
-                    <a:off x="4031312" y="755374"/>
+                    <a:off x="3528862" y="856926"/>
                     <a:ext cx="426085" cy="309880"/>
                   </a:xfrm>
                   <a:prstGeom prst="rect">
@@ -19574,8 +19544,8 @@
                 </p:nvSpPr>
                 <p:spPr>
                   <a:xfrm>
-                    <a:off x="4325592" y="810981"/>
-                    <a:ext cx="993775" cy="274955"/>
+                    <a:off x="3810421" y="855294"/>
+                    <a:ext cx="840435" cy="274955"/>
                   </a:xfrm>
                   <a:prstGeom prst="rect">
                     <a:avLst/>
@@ -19606,7 +19576,7 @@
                         <a:ea typeface="Calibri" panose="020F0502020204030204" pitchFamily="34" charset="0"/>
                         <a:cs typeface="Times New Roman" panose="02020603050405020304" pitchFamily="18" charset="0"/>
                       </a:rPr>
-                      <a:t>Parsons Puzzle</a:t>
+                      <a:t>Parsons Puzzle Quiz</a:t>
                     </a:r>
                     <a:endParaRPr lang="en-AU" sz="2000" dirty="0">
                       <a:effectLst/>
@@ -19631,8 +19601,8 @@
                 </p:nvSpPr>
                 <p:spPr>
                   <a:xfrm rot="16200000">
-                    <a:off x="3369572" y="406331"/>
-                    <a:ext cx="141606" cy="1070486"/>
+                    <a:off x="2927726" y="492299"/>
+                    <a:ext cx="124257" cy="717332"/>
                   </a:xfrm>
                   <a:prstGeom prst="upDownArrow">
                     <a:avLst/>
@@ -19689,7 +19659,7 @@
                 </p:nvSpPr>
                 <p:spPr>
                   <a:xfrm>
-                    <a:off x="2989691" y="683778"/>
+                    <a:off x="2579532" y="624183"/>
                     <a:ext cx="828040" cy="247650"/>
                   </a:xfrm>
                   <a:prstGeom prst="rect">
@@ -19869,7 +19839,7 @@
             </p:nvSpPr>
             <p:spPr>
               <a:xfrm>
-                <a:off x="2286773" y="1245152"/>
+                <a:off x="2112655" y="1232996"/>
                 <a:ext cx="153975" cy="486300"/>
               </a:xfrm>
               <a:prstGeom prst="upDownArrow">
@@ -19935,8 +19905,8 @@
         </p:nvSpPr>
         <p:spPr>
           <a:xfrm>
-            <a:off x="17144811" y="9649361"/>
-            <a:ext cx="4165942" cy="1621790"/>
+            <a:off x="15948596" y="9664514"/>
+            <a:ext cx="5692686" cy="1918077"/>
           </a:xfrm>
           <a:prstGeom prst="rect">
             <a:avLst/>
@@ -19945,7 +19915,10 @@
             <a:schemeClr val="lt1"/>
           </a:solidFill>
           <a:ln w="6350">
-            <a:noFill/>
+            <a:solidFill>
+              <a:schemeClr val="accent2"/>
+            </a:solidFill>
+            <a:prstDash val="dash"/>
           </a:ln>
         </p:spPr>
         <p:txBody>
@@ -19969,7 +19942,7 @@
                 <a:ea typeface="Calibri" panose="020F0502020204030204" pitchFamily="34" charset="0"/>
                 <a:cs typeface="Times New Roman" panose="02020603050405020304" pitchFamily="18" charset="0"/>
               </a:rPr>
-              <a:t>Created H5P Parsons Puzzle Quiz can be viewed and finished, and the results can be shown on Drupal website. The Parsons Puzzle Quiz can be embedded into </a:t>
+              <a:t>Created H5P content - Parsons Puzzle Quiz can be viewed and finished, and the results can be shown on Drupal website. The Parsons Puzzle Quiz can be embedded into </a:t>
             </a:r>
             <a:r>
               <a:rPr lang="en-AU" sz="2000" dirty="0" err="1">
@@ -19987,7 +19960,7 @@
                 <a:ea typeface="Calibri" panose="020F0502020204030204" pitchFamily="34" charset="0"/>
                 <a:cs typeface="Times New Roman" panose="02020603050405020304" pitchFamily="18" charset="0"/>
               </a:rPr>
-              <a:t> through </a:t>
+              <a:t> from Drupal through </a:t>
             </a:r>
             <a:r>
               <a:rPr lang="en-AU" sz="2000" dirty="0" err="1">
@@ -20000,13 +19973,34 @@
             </a:r>
             <a:r>
               <a:rPr lang="en-AU" sz="2000" dirty="0">
-                <a:effectLst/>
                 <a:latin typeface="Calibri" panose="020F0502020204030204" pitchFamily="34" charset="0"/>
                 <a:ea typeface="Calibri" panose="020F0502020204030204" pitchFamily="34" charset="0"/>
                 <a:cs typeface="Times New Roman" panose="02020603050405020304" pitchFamily="18" charset="0"/>
               </a:rPr>
-              <a:t>.</a:t>
+              <a:t>, but not fully integrated with </a:t>
             </a:r>
+            <a:r>
+              <a:rPr lang="en-AU" sz="2000" dirty="0" err="1">
+                <a:latin typeface="Calibri" panose="020F0502020204030204" pitchFamily="34" charset="0"/>
+                <a:ea typeface="Calibri" panose="020F0502020204030204" pitchFamily="34" charset="0"/>
+                <a:cs typeface="Times New Roman" panose="02020603050405020304" pitchFamily="18" charset="0"/>
+              </a:rPr>
+              <a:t>MyUni</a:t>
+            </a:r>
+            <a:r>
+              <a:rPr lang="en-AU" sz="2000" dirty="0">
+                <a:latin typeface="Calibri" panose="020F0502020204030204" pitchFamily="34" charset="0"/>
+                <a:ea typeface="Calibri" panose="020F0502020204030204" pitchFamily="34" charset="0"/>
+                <a:cs typeface="Times New Roman" panose="02020603050405020304" pitchFamily="18" charset="0"/>
+              </a:rPr>
+              <a:t> analytics and grades.</a:t>
+            </a:r>
+            <a:endParaRPr lang="en-AU" sz="2000" dirty="0">
+              <a:effectLst/>
+              <a:latin typeface="Calibri" panose="020F0502020204030204" pitchFamily="34" charset="0"/>
+              <a:ea typeface="Calibri" panose="020F0502020204030204" pitchFamily="34" charset="0"/>
+              <a:cs typeface="Times New Roman" panose="02020603050405020304" pitchFamily="18" charset="0"/>
+            </a:endParaRPr>
           </a:p>
         </p:txBody>
       </p:sp>
@@ -20024,8 +20018,8 @@
         </p:nvSpPr>
         <p:spPr>
           <a:xfrm>
-            <a:off x="13306367" y="11950114"/>
-            <a:ext cx="7429572" cy="1225178"/>
+            <a:off x="13428394" y="12013214"/>
+            <a:ext cx="8212888" cy="1284745"/>
           </a:xfrm>
           <a:prstGeom prst="rect">
             <a:avLst/>
@@ -20034,7 +20028,10 @@
             <a:schemeClr val="lt1"/>
           </a:solidFill>
           <a:ln w="6350">
-            <a:noFill/>
+            <a:solidFill>
+              <a:schemeClr val="accent1"/>
+            </a:solidFill>
+            <a:prstDash val="dash"/>
           </a:ln>
         </p:spPr>
         <p:txBody>
@@ -20077,8 +20074,8 @@
         </p:nvSpPr>
         <p:spPr>
           <a:xfrm>
-            <a:off x="14864955" y="13704333"/>
-            <a:ext cx="5787611" cy="681990"/>
+            <a:off x="14875881" y="13865965"/>
+            <a:ext cx="6765401" cy="681990"/>
           </a:xfrm>
           <a:prstGeom prst="rect">
             <a:avLst/>
@@ -20087,7 +20084,10 @@
             <a:schemeClr val="lt1"/>
           </a:solidFill>
           <a:ln w="6350">
-            <a:noFill/>
+            <a:solidFill>
+              <a:schemeClr val="accent3"/>
+            </a:solidFill>
+            <a:prstDash val="dash"/>
           </a:ln>
         </p:spPr>
         <p:txBody>
@@ -23037,94 +23037,6 @@
       </p:sp>
       <p:sp>
         <p:nvSpPr>
-          <p:cNvPr id="91" name="TextBox 90">
-            <a:extLst>
-              <a:ext uri="{FF2B5EF4-FFF2-40B4-BE49-F238E27FC236}">
-                <a16:creationId xmlns:a16="http://schemas.microsoft.com/office/drawing/2014/main" id="{035F3DED-ED8D-4C9B-B177-6DC606131BCC}"/>
-              </a:ext>
-            </a:extLst>
-          </p:cNvPr>
-          <p:cNvSpPr txBox="1"/>
-          <p:nvPr/>
-        </p:nvSpPr>
-        <p:spPr>
-          <a:xfrm>
-            <a:off x="8485252" y="8876122"/>
-            <a:ext cx="13473743" cy="707886"/>
-          </a:xfrm>
-          <a:prstGeom prst="rect">
-            <a:avLst/>
-          </a:prstGeom>
-          <a:noFill/>
-        </p:spPr>
-        <p:txBody>
-          <a:bodyPr wrap="square" rtlCol="0">
-            <a:spAutoFit/>
-          </a:bodyPr>
-          <a:lstStyle/>
-          <a:p>
-            <a:r>
-              <a:rPr lang="en-AU" sz="2000" dirty="0">
-                <a:solidFill>
-                  <a:prstClr val="black"/>
-                </a:solidFill>
-              </a:rPr>
-              <a:t>The goal is full integration with </a:t>
-            </a:r>
-            <a:r>
-              <a:rPr lang="en-AU" sz="2000" dirty="0" err="1">
-                <a:solidFill>
-                  <a:prstClr val="black"/>
-                </a:solidFill>
-              </a:rPr>
-              <a:t>MyUni</a:t>
-            </a:r>
-            <a:r>
-              <a:rPr lang="en-AU" sz="2000" dirty="0">
-                <a:solidFill>
-                  <a:prstClr val="black"/>
-                </a:solidFill>
-              </a:rPr>
-              <a:t> but access to Canvas instance not possible within project timeframe.  Integration into Drupal as proof of concept.  Can be embedded into </a:t>
-            </a:r>
-            <a:r>
-              <a:rPr lang="en-AU" sz="2000" dirty="0" err="1">
-                <a:solidFill>
-                  <a:prstClr val="black"/>
-                </a:solidFill>
-              </a:rPr>
-              <a:t>MyUni</a:t>
-            </a:r>
-            <a:r>
-              <a:rPr lang="en-AU" sz="2000" dirty="0">
-                <a:solidFill>
-                  <a:prstClr val="black"/>
-                </a:solidFill>
-              </a:rPr>
-              <a:t> but not fully integrated with </a:t>
-            </a:r>
-            <a:r>
-              <a:rPr lang="en-AU" sz="2000" dirty="0" err="1">
-                <a:solidFill>
-                  <a:prstClr val="black"/>
-                </a:solidFill>
-              </a:rPr>
-              <a:t>MyUni</a:t>
-            </a:r>
-            <a:r>
-              <a:rPr lang="en-AU" sz="2000" dirty="0">
-                <a:solidFill>
-                  <a:prstClr val="black"/>
-                </a:solidFill>
-              </a:rPr>
-              <a:t> analytics and grades.</a:t>
-            </a:r>
-            <a:endParaRPr lang="en-AU" sz="2000" dirty="0"/>
-          </a:p>
-        </p:txBody>
-      </p:sp>
-      <p:sp>
-        <p:nvSpPr>
           <p:cNvPr id="303" name="TextBox 302">
             <a:extLst>
               <a:ext uri="{FF2B5EF4-FFF2-40B4-BE49-F238E27FC236}">
@@ -23218,6 +23130,114 @@
           </a:p>
           <a:p>
             <a:endParaRPr lang="en-US" dirty="0"/>
+          </a:p>
+        </p:txBody>
+      </p:sp>
+      <p:pic>
+        <p:nvPicPr>
+          <p:cNvPr id="213" name="Picture 212">
+            <a:extLst>
+              <a:ext uri="{FF2B5EF4-FFF2-40B4-BE49-F238E27FC236}">
+                <a16:creationId xmlns:a16="http://schemas.microsoft.com/office/drawing/2014/main" id="{E503E88B-DFE7-0949-B930-F56441D88BF3}"/>
+              </a:ext>
+            </a:extLst>
+          </p:cNvPr>
+          <p:cNvPicPr>
+            <a:picLocks noChangeAspect="1"/>
+          </p:cNvPicPr>
+          <p:nvPr/>
+        </p:nvPicPr>
+        <p:blipFill>
+          <a:blip r:embed="rId36" cstate="print">
+            <a:extLst>
+              <a:ext uri="{28A0092B-C50C-407E-A947-70E740481C1C}">
+                <a14:useLocalDpi xmlns:a14="http://schemas.microsoft.com/office/drawing/2010/main" val="0"/>
+              </a:ext>
+            </a:extLst>
+          </a:blip>
+          <a:stretch>
+            <a:fillRect/>
+          </a:stretch>
+        </p:blipFill>
+        <p:spPr>
+          <a:xfrm>
+            <a:off x="485849" y="15044844"/>
+            <a:ext cx="815584" cy="815058"/>
+          </a:xfrm>
+          <a:prstGeom prst="rect">
+            <a:avLst/>
+          </a:prstGeom>
+        </p:spPr>
+      </p:pic>
+      <p:sp>
+        <p:nvSpPr>
+          <p:cNvPr id="214" name="Text Box 106">
+            <a:extLst>
+              <a:ext uri="{FF2B5EF4-FFF2-40B4-BE49-F238E27FC236}">
+                <a16:creationId xmlns:a16="http://schemas.microsoft.com/office/drawing/2014/main" id="{EBC210BC-C6BD-B44C-8206-8DEB533994A2}"/>
+              </a:ext>
+            </a:extLst>
+          </p:cNvPr>
+          <p:cNvSpPr txBox="1"/>
+          <p:nvPr/>
+        </p:nvSpPr>
+        <p:spPr>
+          <a:xfrm>
+            <a:off x="8520355" y="8867938"/>
+            <a:ext cx="13120928" cy="712718"/>
+          </a:xfrm>
+          <a:prstGeom prst="rect">
+            <a:avLst/>
+          </a:prstGeom>
+          <a:noFill/>
+          <a:ln w="6350">
+            <a:noFill/>
+          </a:ln>
+        </p:spPr>
+        <p:txBody>
+          <a:bodyPr rot="0" spcFirstLastPara="0" vert="horz" wrap="square" lIns="91440" tIns="45720" rIns="91440" bIns="45720" numCol="1" spcCol="0" rtlCol="0" fromWordArt="0" anchor="t" anchorCtr="0" forceAA="0" compatLnSpc="1">
+            <a:prstTxWarp prst="textNoShape">
+              <a:avLst/>
+            </a:prstTxWarp>
+            <a:noAutofit/>
+          </a:bodyPr>
+          <a:lstStyle/>
+          <a:p>
+            <a:pPr algn="just">
+              <a:spcAft>
+                <a:spcPts val="0"/>
+              </a:spcAft>
+            </a:pPr>
+            <a:r>
+              <a:rPr lang="en-AU" sz="2050" b="1" dirty="0">
+                <a:latin typeface="Calibri" panose="020F0502020204030204" pitchFamily="34" charset="0"/>
+                <a:ea typeface="Calibri" panose="020F0502020204030204" pitchFamily="34" charset="0"/>
+                <a:cs typeface="Times New Roman" panose="02020603050405020304" pitchFamily="18" charset="0"/>
+              </a:rPr>
+              <a:t>The goal of the project is full integration with </a:t>
+            </a:r>
+            <a:r>
+              <a:rPr lang="en-AU" sz="2050" b="1" dirty="0" err="1">
+                <a:latin typeface="Calibri" panose="020F0502020204030204" pitchFamily="34" charset="0"/>
+                <a:ea typeface="Calibri" panose="020F0502020204030204" pitchFamily="34" charset="0"/>
+                <a:cs typeface="Times New Roman" panose="02020603050405020304" pitchFamily="18" charset="0"/>
+              </a:rPr>
+              <a:t>MyUni</a:t>
+            </a:r>
+            <a:r>
+              <a:rPr lang="en-AU" sz="2050" b="1" dirty="0">
+                <a:latin typeface="Calibri" panose="020F0502020204030204" pitchFamily="34" charset="0"/>
+                <a:ea typeface="Calibri" panose="020F0502020204030204" pitchFamily="34" charset="0"/>
+                <a:cs typeface="Times New Roman" panose="02020603050405020304" pitchFamily="18" charset="0"/>
+              </a:rPr>
+              <a:t>, but accessing to Canvas instances is not possible within the project timeframe. Integration into Drupal is implemented as a proof of concept. </a:t>
+            </a:r>
+            <a:endParaRPr lang="en-AU" sz="2050" b="1" dirty="0">
+              <a:effectLst/>
+              <a:latin typeface="Calibri" panose="020F0502020204030204" pitchFamily="34" charset="0"/>
+              <a:ea typeface="Calibri" panose="020F0502020204030204" pitchFamily="34" charset="0"/>
+              <a:cs typeface="Times New Roman" panose="02020603050405020304" pitchFamily="18" charset="0"/>
+            </a:endParaRPr>
           </a:p>
         </p:txBody>
       </p:sp>

</xml_diff>